<commit_message>
[WIP] added vdc-agent to vdc-dummy (java) not)
</commit_message>
<xml_diff>
--- a/Architecture.pptx
+++ b/Architecture.pptx
@@ -264,7 +264,7 @@
           <a:p>
             <a:fld id="{D0B1FB4A-0F19-4428-8AE7-EC31C1D3BD6D}" type="datetimeFigureOut">
               <a:rPr lang="en-US" smtClean="0"/>
-              <a:t>12-Jan-18</a:t>
+              <a:t>23-Jan-18</a:t>
             </a:fld>
             <a:endParaRPr lang="en-US"/>
           </a:p>
@@ -462,7 +462,7 @@
           <a:p>
             <a:fld id="{D0B1FB4A-0F19-4428-8AE7-EC31C1D3BD6D}" type="datetimeFigureOut">
               <a:rPr lang="en-US" smtClean="0"/>
-              <a:t>12-Jan-18</a:t>
+              <a:t>23-Jan-18</a:t>
             </a:fld>
             <a:endParaRPr lang="en-US"/>
           </a:p>
@@ -670,7 +670,7 @@
           <a:p>
             <a:fld id="{D0B1FB4A-0F19-4428-8AE7-EC31C1D3BD6D}" type="datetimeFigureOut">
               <a:rPr lang="en-US" smtClean="0"/>
-              <a:t>12-Jan-18</a:t>
+              <a:t>23-Jan-18</a:t>
             </a:fld>
             <a:endParaRPr lang="en-US"/>
           </a:p>
@@ -868,7 +868,7 @@
           <a:p>
             <a:fld id="{D0B1FB4A-0F19-4428-8AE7-EC31C1D3BD6D}" type="datetimeFigureOut">
               <a:rPr lang="en-US" smtClean="0"/>
-              <a:t>12-Jan-18</a:t>
+              <a:t>23-Jan-18</a:t>
             </a:fld>
             <a:endParaRPr lang="en-US"/>
           </a:p>
@@ -1143,7 +1143,7 @@
           <a:p>
             <a:fld id="{D0B1FB4A-0F19-4428-8AE7-EC31C1D3BD6D}" type="datetimeFigureOut">
               <a:rPr lang="en-US" smtClean="0"/>
-              <a:t>12-Jan-18</a:t>
+              <a:t>23-Jan-18</a:t>
             </a:fld>
             <a:endParaRPr lang="en-US"/>
           </a:p>
@@ -1408,7 +1408,7 @@
           <a:p>
             <a:fld id="{D0B1FB4A-0F19-4428-8AE7-EC31C1D3BD6D}" type="datetimeFigureOut">
               <a:rPr lang="en-US" smtClean="0"/>
-              <a:t>12-Jan-18</a:t>
+              <a:t>23-Jan-18</a:t>
             </a:fld>
             <a:endParaRPr lang="en-US"/>
           </a:p>
@@ -1820,7 +1820,7 @@
           <a:p>
             <a:fld id="{D0B1FB4A-0F19-4428-8AE7-EC31C1D3BD6D}" type="datetimeFigureOut">
               <a:rPr lang="en-US" smtClean="0"/>
-              <a:t>12-Jan-18</a:t>
+              <a:t>23-Jan-18</a:t>
             </a:fld>
             <a:endParaRPr lang="en-US"/>
           </a:p>
@@ -1961,7 +1961,7 @@
           <a:p>
             <a:fld id="{D0B1FB4A-0F19-4428-8AE7-EC31C1D3BD6D}" type="datetimeFigureOut">
               <a:rPr lang="en-US" smtClean="0"/>
-              <a:t>12-Jan-18</a:t>
+              <a:t>23-Jan-18</a:t>
             </a:fld>
             <a:endParaRPr lang="en-US"/>
           </a:p>
@@ -2074,7 +2074,7 @@
           <a:p>
             <a:fld id="{D0B1FB4A-0F19-4428-8AE7-EC31C1D3BD6D}" type="datetimeFigureOut">
               <a:rPr lang="en-US" smtClean="0"/>
-              <a:t>12-Jan-18</a:t>
+              <a:t>23-Jan-18</a:t>
             </a:fld>
             <a:endParaRPr lang="en-US"/>
           </a:p>
@@ -2385,7 +2385,7 @@
           <a:p>
             <a:fld id="{D0B1FB4A-0F19-4428-8AE7-EC31C1D3BD6D}" type="datetimeFigureOut">
               <a:rPr lang="en-US" smtClean="0"/>
-              <a:t>12-Jan-18</a:t>
+              <a:t>23-Jan-18</a:t>
             </a:fld>
             <a:endParaRPr lang="en-US"/>
           </a:p>
@@ -2673,7 +2673,7 @@
           <a:p>
             <a:fld id="{D0B1FB4A-0F19-4428-8AE7-EC31C1D3BD6D}" type="datetimeFigureOut">
               <a:rPr lang="en-US" smtClean="0"/>
-              <a:t>12-Jan-18</a:t>
+              <a:t>23-Jan-18</a:t>
             </a:fld>
             <a:endParaRPr lang="en-US"/>
           </a:p>
@@ -2914,7 +2914,7 @@
           <a:p>
             <a:fld id="{D0B1FB4A-0F19-4428-8AE7-EC31C1D3BD6D}" type="datetimeFigureOut">
               <a:rPr lang="en-US" smtClean="0"/>
-              <a:t>12-Jan-18</a:t>
+              <a:t>23-Jan-18</a:t>
             </a:fld>
             <a:endParaRPr lang="en-US"/>
           </a:p>
@@ -4751,7 +4751,7 @@
         </p:nvSpPr>
         <p:spPr>
           <a:xfrm>
-            <a:off x="4136399" y="3867813"/>
+            <a:off x="3828495" y="4849248"/>
             <a:ext cx="3056721" cy="431074"/>
           </a:xfrm>
           <a:prstGeom prst="roundRect">
@@ -5124,7 +5124,7 @@
         </p:nvGrpSpPr>
         <p:grpSpPr>
           <a:xfrm>
-            <a:off x="8298957" y="2826631"/>
+            <a:off x="8299499" y="3877304"/>
             <a:ext cx="892158" cy="857252"/>
             <a:chOff x="8419633" y="1924593"/>
             <a:chExt cx="1268846" cy="1219202"/>
@@ -5608,8 +5608,8 @@
         </p:nvCxnSpPr>
         <p:spPr>
           <a:xfrm flipV="1">
-            <a:off x="7193120" y="3683883"/>
-            <a:ext cx="1552463" cy="399467"/>
+            <a:off x="6885216" y="4734556"/>
+            <a:ext cx="1860909" cy="330229"/>
           </a:xfrm>
           <a:prstGeom prst="bentConnector2">
             <a:avLst/>
@@ -5652,8 +5652,8 @@
         </p:nvCxnSpPr>
         <p:spPr>
           <a:xfrm rot="16200000" flipH="1">
-            <a:off x="7480768" y="2156929"/>
-            <a:ext cx="204129" cy="1432250"/>
+            <a:off x="6955702" y="2681995"/>
+            <a:ext cx="1254802" cy="1432792"/>
           </a:xfrm>
           <a:prstGeom prst="bentConnector2">
             <a:avLst/>
@@ -5696,8 +5696,8 @@
         </p:nvCxnSpPr>
         <p:spPr>
           <a:xfrm rot="16200000" flipH="1">
-            <a:off x="6732734" y="1687940"/>
-            <a:ext cx="484267" cy="2650365"/>
+            <a:off x="6207668" y="2213006"/>
+            <a:ext cx="1534940" cy="2650907"/>
           </a:xfrm>
           <a:prstGeom prst="bentConnector2">
             <a:avLst/>
@@ -5740,8 +5740,8 @@
         </p:nvCxnSpPr>
         <p:spPr>
           <a:xfrm rot="16200000" flipH="1">
-            <a:off x="5544300" y="779648"/>
-            <a:ext cx="1177092" cy="4334401"/>
+            <a:off x="5019237" y="1304712"/>
+            <a:ext cx="2227765" cy="4334946"/>
           </a:xfrm>
           <a:prstGeom prst="bentConnector2">
             <a:avLst/>
@@ -5824,7 +5824,7 @@
         </p:nvSpPr>
         <p:spPr>
           <a:xfrm>
-            <a:off x="4083228" y="3341704"/>
+            <a:off x="4036256" y="4365224"/>
             <a:ext cx="1628504" cy="369332"/>
           </a:xfrm>
           <a:prstGeom prst="rect">
@@ -5866,7 +5866,7 @@
         </p:nvSpPr>
         <p:spPr>
           <a:xfrm>
-            <a:off x="5773778" y="3153543"/>
+            <a:off x="5900056" y="4181650"/>
             <a:ext cx="1628504" cy="246221"/>
           </a:xfrm>
           <a:prstGeom prst="rect">
@@ -5908,7 +5908,7 @@
         </p:nvSpPr>
         <p:spPr>
           <a:xfrm>
-            <a:off x="6974866" y="2850597"/>
+            <a:off x="7003130" y="3907871"/>
             <a:ext cx="1147356" cy="215444"/>
           </a:xfrm>
           <a:prstGeom prst="rect">
@@ -6039,7 +6039,7 @@
         </p:nvSpPr>
         <p:spPr>
           <a:xfrm>
-            <a:off x="7339845" y="3974934"/>
+            <a:off x="7186166" y="4916961"/>
             <a:ext cx="1307827" cy="230832"/>
           </a:xfrm>
           <a:prstGeom prst="rect">
@@ -6106,6 +6106,233 @@
           </a:fontRef>
         </p:style>
       </p:cxnSp>
+      <p:sp>
+        <p:nvSpPr>
+          <p:cNvPr id="2" name="Rectangle 1">
+            <a:extLst>
+              <a:ext uri="{FF2B5EF4-FFF2-40B4-BE49-F238E27FC236}">
+                <a16:creationId xmlns:a16="http://schemas.microsoft.com/office/drawing/2014/main" id="{62DD10FE-61F7-43EF-9134-1DC131BE6173}"/>
+              </a:ext>
+            </a:extLst>
+          </p:cNvPr>
+          <p:cNvSpPr/>
+          <p:nvPr/>
+        </p:nvSpPr>
+        <p:spPr>
+          <a:xfrm>
+            <a:off x="8299499" y="2981074"/>
+            <a:ext cx="891065" cy="695307"/>
+          </a:xfrm>
+          <a:prstGeom prst="rect">
+            <a:avLst/>
+          </a:prstGeom>
+        </p:spPr>
+        <p:style>
+          <a:lnRef idx="2">
+            <a:schemeClr val="accent1">
+              <a:shade val="50000"/>
+            </a:schemeClr>
+          </a:lnRef>
+          <a:fillRef idx="1">
+            <a:schemeClr val="accent1"/>
+          </a:fillRef>
+          <a:effectRef idx="0">
+            <a:schemeClr val="accent1"/>
+          </a:effectRef>
+          <a:fontRef idx="minor">
+            <a:schemeClr val="lt1"/>
+          </a:fontRef>
+        </p:style>
+        <p:txBody>
+          <a:bodyPr rtlCol="0" anchor="ctr"/>
+          <a:lstStyle/>
+          <a:p>
+            <a:pPr algn="ctr"/>
+            <a:r>
+              <a:rPr lang="en-US" dirty="0" err="1"/>
+              <a:t>Zipkin</a:t>
+            </a:r>
+            <a:endParaRPr lang="de-DE" dirty="0"/>
+          </a:p>
+        </p:txBody>
+      </p:sp>
+      <p:cxnSp>
+        <p:nvCxnSpPr>
+          <p:cNvPr id="41" name="Connector: Elbow 40">
+            <a:extLst>
+              <a:ext uri="{FF2B5EF4-FFF2-40B4-BE49-F238E27FC236}">
+                <a16:creationId xmlns:a16="http://schemas.microsoft.com/office/drawing/2014/main" id="{EAF7EBB8-B1EF-46A6-AB6D-AFA6060928D0}"/>
+              </a:ext>
+            </a:extLst>
+          </p:cNvPr>
+          <p:cNvCxnSpPr>
+            <a:cxnSpLocks/>
+            <a:stCxn id="7" idx="2"/>
+            <a:endCxn id="2" idx="1"/>
+          </p:cNvCxnSpPr>
+          <p:nvPr/>
+        </p:nvCxnSpPr>
+        <p:spPr>
+          <a:xfrm rot="16200000" flipH="1">
+            <a:off x="6695723" y="1724952"/>
+            <a:ext cx="557738" cy="2649814"/>
+          </a:xfrm>
+          <a:prstGeom prst="bentConnector2">
+            <a:avLst/>
+          </a:prstGeom>
+          <a:ln w="19050">
+            <a:solidFill>
+              <a:schemeClr val="accent6"/>
+            </a:solidFill>
+            <a:headEnd type="none" w="med" len="med"/>
+            <a:tailEnd type="triangle" w="med" len="med"/>
+          </a:ln>
+        </p:spPr>
+        <p:style>
+          <a:lnRef idx="1">
+            <a:schemeClr val="accent2"/>
+          </a:lnRef>
+          <a:fillRef idx="0">
+            <a:schemeClr val="accent2"/>
+          </a:fillRef>
+          <a:effectRef idx="0">
+            <a:schemeClr val="accent2"/>
+          </a:effectRef>
+          <a:fontRef idx="minor">
+            <a:schemeClr val="tx1"/>
+          </a:fontRef>
+        </p:style>
+      </p:cxnSp>
+      <p:cxnSp>
+        <p:nvCxnSpPr>
+          <p:cNvPr id="45" name="Connector: Elbow 44">
+            <a:extLst>
+              <a:ext uri="{FF2B5EF4-FFF2-40B4-BE49-F238E27FC236}">
+                <a16:creationId xmlns:a16="http://schemas.microsoft.com/office/drawing/2014/main" id="{74262329-3019-41F5-A6F4-E043525D9FB8}"/>
+              </a:ext>
+            </a:extLst>
+          </p:cNvPr>
+          <p:cNvCxnSpPr>
+            <a:cxnSpLocks/>
+            <a:stCxn id="6" idx="2"/>
+          </p:cNvCxnSpPr>
+          <p:nvPr/>
+        </p:nvCxnSpPr>
+        <p:spPr>
+          <a:xfrm rot="16200000" flipH="1">
+            <a:off x="5547232" y="776717"/>
+            <a:ext cx="1169590" cy="4332762"/>
+          </a:xfrm>
+          <a:prstGeom prst="bentConnector2">
+            <a:avLst/>
+          </a:prstGeom>
+          <a:ln w="19050">
+            <a:solidFill>
+              <a:schemeClr val="accent6"/>
+            </a:solidFill>
+            <a:headEnd type="none" w="med" len="med"/>
+            <a:tailEnd type="triangle" w="med" len="med"/>
+          </a:ln>
+        </p:spPr>
+        <p:style>
+          <a:lnRef idx="1">
+            <a:schemeClr val="accent2"/>
+          </a:lnRef>
+          <a:fillRef idx="0">
+            <a:schemeClr val="accent2"/>
+          </a:fillRef>
+          <a:effectRef idx="0">
+            <a:schemeClr val="accent2"/>
+          </a:effectRef>
+          <a:fontRef idx="minor">
+            <a:schemeClr val="tx1"/>
+          </a:fontRef>
+        </p:style>
+      </p:cxnSp>
+      <p:sp>
+        <p:nvSpPr>
+          <p:cNvPr id="53" name="TextBox 52">
+            <a:extLst>
+              <a:ext uri="{FF2B5EF4-FFF2-40B4-BE49-F238E27FC236}">
+                <a16:creationId xmlns:a16="http://schemas.microsoft.com/office/drawing/2014/main" id="{70548A77-4F48-4E82-B2ED-B06354262D3E}"/>
+              </a:ext>
+            </a:extLst>
+          </p:cNvPr>
+          <p:cNvSpPr txBox="1"/>
+          <p:nvPr/>
+        </p:nvSpPr>
+        <p:spPr>
+          <a:xfrm>
+            <a:off x="4058023" y="3407511"/>
+            <a:ext cx="1362886" cy="246221"/>
+          </a:xfrm>
+          <a:prstGeom prst="rect">
+            <a:avLst/>
+          </a:prstGeom>
+          <a:solidFill>
+            <a:schemeClr val="bg1"/>
+          </a:solidFill>
+          <a:ln>
+            <a:solidFill>
+              <a:schemeClr val="tx1"/>
+            </a:solidFill>
+          </a:ln>
+        </p:spPr>
+        <p:txBody>
+          <a:bodyPr wrap="square" rtlCol="0">
+            <a:spAutoFit/>
+          </a:bodyPr>
+          <a:lstStyle/>
+          <a:p>
+            <a:r>
+              <a:rPr lang="en-US" sz="1000" dirty="0"/>
+              <a:t>Audit-Trace</a:t>
+            </a:r>
+          </a:p>
+        </p:txBody>
+      </p:sp>
+      <p:sp>
+        <p:nvSpPr>
+          <p:cNvPr id="54" name="TextBox 53">
+            <a:extLst>
+              <a:ext uri="{FF2B5EF4-FFF2-40B4-BE49-F238E27FC236}">
+                <a16:creationId xmlns:a16="http://schemas.microsoft.com/office/drawing/2014/main" id="{E708983A-CF61-4DBE-8F3F-470F73AF3657}"/>
+              </a:ext>
+            </a:extLst>
+          </p:cNvPr>
+          <p:cNvSpPr txBox="1"/>
+          <p:nvPr/>
+        </p:nvSpPr>
+        <p:spPr>
+          <a:xfrm>
+            <a:off x="5829657" y="3199830"/>
+            <a:ext cx="884651" cy="246221"/>
+          </a:xfrm>
+          <a:prstGeom prst="rect">
+            <a:avLst/>
+          </a:prstGeom>
+          <a:solidFill>
+            <a:schemeClr val="bg1"/>
+          </a:solidFill>
+          <a:ln>
+            <a:solidFill>
+              <a:schemeClr val="tx1"/>
+            </a:solidFill>
+          </a:ln>
+        </p:spPr>
+        <p:txBody>
+          <a:bodyPr wrap="square" rtlCol="0">
+            <a:spAutoFit/>
+          </a:bodyPr>
+          <a:lstStyle/>
+          <a:p>
+            <a:r>
+              <a:rPr lang="en-US" sz="1000" dirty="0"/>
+              <a:t>Audit-Trace</a:t>
+            </a:r>
+          </a:p>
+        </p:txBody>
+      </p:sp>
     </p:spTree>
     <p:extLst>
       <p:ext uri="{BB962C8B-B14F-4D97-AF65-F5344CB8AC3E}">

</xml_diff>

<commit_message>
improved java example for tracing
</commit_message>
<xml_diff>
--- a/Architecture.pptx
+++ b/Architecture.pptx
@@ -264,7 +264,7 @@
           <a:p>
             <a:fld id="{D0B1FB4A-0F19-4428-8AE7-EC31C1D3BD6D}" type="datetimeFigureOut">
               <a:rPr lang="en-US" smtClean="0"/>
-              <a:t>23-Jan-18</a:t>
+              <a:t>05-Feb-18</a:t>
             </a:fld>
             <a:endParaRPr lang="en-US"/>
           </a:p>
@@ -462,7 +462,7 @@
           <a:p>
             <a:fld id="{D0B1FB4A-0F19-4428-8AE7-EC31C1D3BD6D}" type="datetimeFigureOut">
               <a:rPr lang="en-US" smtClean="0"/>
-              <a:t>23-Jan-18</a:t>
+              <a:t>05-Feb-18</a:t>
             </a:fld>
             <a:endParaRPr lang="en-US"/>
           </a:p>
@@ -670,7 +670,7 @@
           <a:p>
             <a:fld id="{D0B1FB4A-0F19-4428-8AE7-EC31C1D3BD6D}" type="datetimeFigureOut">
               <a:rPr lang="en-US" smtClean="0"/>
-              <a:t>23-Jan-18</a:t>
+              <a:t>05-Feb-18</a:t>
             </a:fld>
             <a:endParaRPr lang="en-US"/>
           </a:p>
@@ -868,7 +868,7 @@
           <a:p>
             <a:fld id="{D0B1FB4A-0F19-4428-8AE7-EC31C1D3BD6D}" type="datetimeFigureOut">
               <a:rPr lang="en-US" smtClean="0"/>
-              <a:t>23-Jan-18</a:t>
+              <a:t>05-Feb-18</a:t>
             </a:fld>
             <a:endParaRPr lang="en-US"/>
           </a:p>
@@ -1143,7 +1143,7 @@
           <a:p>
             <a:fld id="{D0B1FB4A-0F19-4428-8AE7-EC31C1D3BD6D}" type="datetimeFigureOut">
               <a:rPr lang="en-US" smtClean="0"/>
-              <a:t>23-Jan-18</a:t>
+              <a:t>05-Feb-18</a:t>
             </a:fld>
             <a:endParaRPr lang="en-US"/>
           </a:p>
@@ -1408,7 +1408,7 @@
           <a:p>
             <a:fld id="{D0B1FB4A-0F19-4428-8AE7-EC31C1D3BD6D}" type="datetimeFigureOut">
               <a:rPr lang="en-US" smtClean="0"/>
-              <a:t>23-Jan-18</a:t>
+              <a:t>05-Feb-18</a:t>
             </a:fld>
             <a:endParaRPr lang="en-US"/>
           </a:p>
@@ -1820,7 +1820,7 @@
           <a:p>
             <a:fld id="{D0B1FB4A-0F19-4428-8AE7-EC31C1D3BD6D}" type="datetimeFigureOut">
               <a:rPr lang="en-US" smtClean="0"/>
-              <a:t>23-Jan-18</a:t>
+              <a:t>05-Feb-18</a:t>
             </a:fld>
             <a:endParaRPr lang="en-US"/>
           </a:p>
@@ -1961,7 +1961,7 @@
           <a:p>
             <a:fld id="{D0B1FB4A-0F19-4428-8AE7-EC31C1D3BD6D}" type="datetimeFigureOut">
               <a:rPr lang="en-US" smtClean="0"/>
-              <a:t>23-Jan-18</a:t>
+              <a:t>05-Feb-18</a:t>
             </a:fld>
             <a:endParaRPr lang="en-US"/>
           </a:p>
@@ -2074,7 +2074,7 @@
           <a:p>
             <a:fld id="{D0B1FB4A-0F19-4428-8AE7-EC31C1D3BD6D}" type="datetimeFigureOut">
               <a:rPr lang="en-US" smtClean="0"/>
-              <a:t>23-Jan-18</a:t>
+              <a:t>05-Feb-18</a:t>
             </a:fld>
             <a:endParaRPr lang="en-US"/>
           </a:p>
@@ -2385,7 +2385,7 @@
           <a:p>
             <a:fld id="{D0B1FB4A-0F19-4428-8AE7-EC31C1D3BD6D}" type="datetimeFigureOut">
               <a:rPr lang="en-US" smtClean="0"/>
-              <a:t>23-Jan-18</a:t>
+              <a:t>05-Feb-18</a:t>
             </a:fld>
             <a:endParaRPr lang="en-US"/>
           </a:p>
@@ -2673,7 +2673,7 @@
           <a:p>
             <a:fld id="{D0B1FB4A-0F19-4428-8AE7-EC31C1D3BD6D}" type="datetimeFigureOut">
               <a:rPr lang="en-US" smtClean="0"/>
-              <a:t>23-Jan-18</a:t>
+              <a:t>05-Feb-18</a:t>
             </a:fld>
             <a:endParaRPr lang="en-US"/>
           </a:p>
@@ -2914,7 +2914,7 @@
           <a:p>
             <a:fld id="{D0B1FB4A-0F19-4428-8AE7-EC31C1D3BD6D}" type="datetimeFigureOut">
               <a:rPr lang="en-US" smtClean="0"/>
-              <a:t>23-Jan-18</a:t>
+              <a:t>05-Feb-18</a:t>
             </a:fld>
             <a:endParaRPr lang="en-US"/>
           </a:p>
@@ -4500,8 +4500,8 @@
         </p:nvSpPr>
         <p:spPr>
           <a:xfrm>
-            <a:off x="4563291" y="1219388"/>
-            <a:ext cx="2571205" cy="1684887"/>
+            <a:off x="3631475" y="676510"/>
+            <a:ext cx="3503022" cy="2227765"/>
           </a:xfrm>
           <a:prstGeom prst="roundRect">
             <a:avLst>
@@ -6333,6 +6333,55 @@
           </a:p>
         </p:txBody>
       </p:sp>
+      <p:cxnSp>
+        <p:nvCxnSpPr>
+          <p:cNvPr id="44" name="Connector: Elbow 43">
+            <a:extLst>
+              <a:ext uri="{FF2B5EF4-FFF2-40B4-BE49-F238E27FC236}">
+                <a16:creationId xmlns:a16="http://schemas.microsoft.com/office/drawing/2014/main" id="{D7C1E025-F89D-47B2-ACF9-050C6A92BBD3}"/>
+              </a:ext>
+            </a:extLst>
+          </p:cNvPr>
+          <p:cNvCxnSpPr>
+            <a:cxnSpLocks/>
+            <a:stCxn id="2" idx="2"/>
+            <a:endCxn id="20" idx="1"/>
+          </p:cNvCxnSpPr>
+          <p:nvPr/>
+        </p:nvCxnSpPr>
+        <p:spPr>
+          <a:xfrm rot="5400000">
+            <a:off x="8644571" y="3776842"/>
+            <a:ext cx="200923" cy="12700"/>
+          </a:xfrm>
+          <a:prstGeom prst="bentConnector3">
+            <a:avLst>
+              <a:gd name="adj1" fmla="val 84674"/>
+            </a:avLst>
+          </a:prstGeom>
+          <a:ln w="19050">
+            <a:solidFill>
+              <a:schemeClr val="accent6"/>
+            </a:solidFill>
+            <a:headEnd type="none" w="med" len="med"/>
+            <a:tailEnd type="triangle" w="med" len="med"/>
+          </a:ln>
+        </p:spPr>
+        <p:style>
+          <a:lnRef idx="1">
+            <a:schemeClr val="accent2"/>
+          </a:lnRef>
+          <a:fillRef idx="0">
+            <a:schemeClr val="accent2"/>
+          </a:fillRef>
+          <a:effectRef idx="0">
+            <a:schemeClr val="accent2"/>
+          </a:effectRef>
+          <a:fontRef idx="minor">
+            <a:schemeClr val="tx1"/>
+          </a:fontRef>
+        </p:style>
+      </p:cxnSp>
     </p:spTree>
     <p:extLst>
       <p:ext uri="{BB962C8B-B14F-4D97-AF65-F5344CB8AC3E}">

</xml_diff>